<commit_message>
fixed some text in lecture 7
</commit_message>
<xml_diff>
--- a/lectures/lecture #7 presentation.pptx
+++ b/lectures/lecture #7 presentation.pptx
@@ -212,7 +212,7 @@
           <a:p>
             <a:fld id="{9F16E362-832A-824E-B063-25F5DE831740}" type="datetimeFigureOut">
               <a:rPr lang="en-RU" smtClean="0"/>
-              <a:t>03.12.2021</a:t>
+              <a:t>21.12.2021</a:t>
             </a:fld>
             <a:endParaRPr lang="en-RU"/>
           </a:p>
@@ -6709,7 +6709,7 @@
             <a:pPr hangingPunct="0"/>
             <a:r>
               <a:rPr lang="en-GB" dirty="0"/>
-              <a:t>In Python, for example, if we create a list and create a variable to which we assign the value of this list, we will NOT copy the sheet, but create a link to it!</a:t>
+              <a:t>In Python, for example, if we create a list and create a variable to which we assign the value of this list, we will NOT copy the list, but create a reference to it!</a:t>
             </a:r>
           </a:p>
         </p:txBody>

</xml_diff>